<commit_message>
Added data import and made minor changes
</commit_message>
<xml_diff>
--- a/ex1/ex1.pptx
+++ b/ex1/ex1.pptx
@@ -5,7 +5,7 @@
     <p:sldMasterId id="2147483648" r:id="rId1"/>
   </p:sldMasterIdLst>
   <p:notesMasterIdLst>
-    <p:notesMasterId r:id="rId23"/>
+    <p:notesMasterId r:id="rId25"/>
   </p:notesMasterIdLst>
   <p:sldIdLst>
     <p:sldId id="256" r:id="rId2"/>
@@ -29,6 +29,8 @@
     <p:sldId id="280" r:id="rId20"/>
     <p:sldId id="281" r:id="rId21"/>
     <p:sldId id="282" r:id="rId22"/>
+    <p:sldId id="307" r:id="rId23"/>
+    <p:sldId id="308" r:id="rId24"/>
   </p:sldIdLst>
   <p:sldSz cx="12192000" cy="6858000"/>
   <p:notesSz cx="6400800" cy="8686800"/>
@@ -939,7 +941,7 @@
           <a:p>
             <a:fld id="{65B8AF12-45A3-4A30-92AC-F02D349C72FA}" type="datetime1">
               <a:rPr lang="en-US" smtClean="0"/>
-              <a:t>5/26/2020</a:t>
+              <a:t>6/9/2020</a:t>
             </a:fld>
             <a:endParaRPr lang="en-US" dirty="0"/>
           </a:p>
@@ -1267,7 +1269,7 @@
           <a:p>
             <a:fld id="{6EBA07AD-2EF6-4B78-B38A-E448410096B5}" type="datetime1">
               <a:rPr lang="en-US" smtClean="0"/>
-              <a:t>5/26/2020</a:t>
+              <a:t>6/9/2020</a:t>
             </a:fld>
             <a:endParaRPr lang="en-US" dirty="0"/>
           </a:p>
@@ -1508,7 +1510,7 @@
           <a:p>
             <a:fld id="{EE1BEC77-4A4B-4C40-AD84-EA4A474BA86C}" type="datetime1">
               <a:rPr lang="en-US" smtClean="0"/>
-              <a:t>5/26/2020</a:t>
+              <a:t>6/9/2020</a:t>
             </a:fld>
             <a:endParaRPr lang="en-US" dirty="0"/>
           </a:p>
@@ -1635,7 +1637,7 @@
           <a:p>
             <a:fld id="{67EEA55A-062B-435E-9284-3D1AF02DDBF7}" type="datetime1">
               <a:rPr lang="en-US" smtClean="0"/>
-              <a:t>5/26/2020</a:t>
+              <a:t>6/9/2020</a:t>
             </a:fld>
             <a:endParaRPr lang="en-US" dirty="0"/>
           </a:p>
@@ -1823,7 +1825,7 @@
           <a:p>
             <a:fld id="{B0442B92-678C-4F93-BEAB-38556D7F5975}" type="datetime1">
               <a:rPr lang="en-US" smtClean="0"/>
-              <a:t>5/26/2020</a:t>
+              <a:t>6/9/2020</a:t>
             </a:fld>
             <a:endParaRPr lang="en-US" dirty="0"/>
           </a:p>
@@ -2258,7 +2260,7 @@
           <a:p>
             <a:fld id="{49BF0097-4817-429F-84C9-CC008780AF2B}" type="datetime1">
               <a:rPr lang="en-US" smtClean="0"/>
-              <a:t>5/26/2020</a:t>
+              <a:t>6/9/2020</a:t>
             </a:fld>
             <a:endParaRPr lang="en-US" dirty="0"/>
           </a:p>
@@ -3155,7 +3157,7 @@
           <a:p>
             <a:fld id="{6D8D7472-82ED-4121-A30A-758F79A85764}" type="datetime1">
               <a:rPr lang="en-US" smtClean="0"/>
-              <a:t>5/26/2020</a:t>
+              <a:t>6/9/2020</a:t>
             </a:fld>
             <a:endParaRPr lang="en-US" dirty="0"/>
           </a:p>
@@ -3396,7 +3398,7 @@
           <a:p>
             <a:fld id="{2A9D6B40-7A24-47E3-B9F1-AC1E089D786C}" type="datetime1">
               <a:rPr lang="en-US" smtClean="0"/>
-              <a:t>5/26/2020</a:t>
+              <a:t>6/9/2020</a:t>
             </a:fld>
             <a:endParaRPr lang="en-US" dirty="0"/>
           </a:p>
@@ -3683,7 +3685,7 @@
           <a:p>
             <a:fld id="{896732A4-7F2C-48A3-AE93-181D0B3CDA43}" type="datetime1">
               <a:rPr lang="en-US" smtClean="0"/>
-              <a:t>5/26/2020</a:t>
+              <a:t>6/9/2020</a:t>
             </a:fld>
             <a:endParaRPr lang="en-US" dirty="0"/>
           </a:p>
@@ -3966,7 +3968,7 @@
           <a:p>
             <a:fld id="{9FC26D47-47D1-43CB-B8F4-8F81031308A2}" type="datetime1">
               <a:rPr lang="en-US" smtClean="0"/>
-              <a:t>5/26/2020</a:t>
+              <a:t>6/9/2020</a:t>
             </a:fld>
             <a:endParaRPr lang="en-US" dirty="0"/>
           </a:p>
@@ -4131,7 +4133,7 @@
           <a:p>
             <a:fld id="{9ACC82F1-5673-4F13-9125-308924E86C01}" type="datetime1">
               <a:rPr lang="en-US" smtClean="0"/>
-              <a:t>5/26/2020</a:t>
+              <a:t>6/9/2020</a:t>
             </a:fld>
             <a:endParaRPr lang="en-US" dirty="0"/>
           </a:p>
@@ -4317,7 +4319,7 @@
           <a:p>
             <a:fld id="{B500F0C5-CDC2-44DD-A142-EC772229D5D2}" type="datetime1">
               <a:rPr lang="en-US" smtClean="0"/>
-              <a:t>5/26/2020</a:t>
+              <a:t>6/9/2020</a:t>
             </a:fld>
             <a:endParaRPr lang="en-US" dirty="0"/>
           </a:p>
@@ -4524,7 +4526,7 @@
                 <a:cs typeface="Consolas" panose="020B0609020204030204" pitchFamily="49" charset="0"/>
                 <a:hlinkClick r:id="rId2"/>
               </a:rPr>
-              <a:t>https://github.com/philippnkling/foundationsdatascience-2020.git</a:t>
+              <a:t>https://github.com/css-zurich/fds-2020-exercise.git</a:t>
             </a:r>
             <a:endParaRPr lang="en-US" dirty="0">
               <a:latin typeface="Consolas" panose="020B0609020204030204" pitchFamily="49" charset="0"/>
@@ -4569,12 +4571,6 @@
               </a:rPr>
               <a:t>Run the first lines of code</a:t>
             </a:r>
-            <a:endParaRPr lang="en-US" dirty="0"/>
-          </a:p>
-          <a:p>
-            <a:pPr marL="342000" lvl="1" indent="0">
-              <a:buNone/>
-            </a:pPr>
             <a:endParaRPr lang="en-US" dirty="0"/>
           </a:p>
         </p:txBody>
@@ -4601,7 +4597,7 @@
           <a:p>
             <a:fld id="{9FC26D47-47D1-43CB-B8F4-8F81031308A2}" type="datetime1">
               <a:rPr lang="en-US" smtClean="0"/>
-              <a:t>5/26/2020</a:t>
+              <a:t>6/9/2020</a:t>
             </a:fld>
             <a:endParaRPr lang="en-US" dirty="0"/>
           </a:p>
@@ -4800,7 +4796,7 @@
           <a:p>
             <a:fld id="{9FC26D47-47D1-43CB-B8F4-8F81031308A2}" type="datetime1">
               <a:rPr lang="en-US" smtClean="0"/>
-              <a:t>5/26/2020</a:t>
+              <a:t>6/9/2020</a:t>
             </a:fld>
             <a:endParaRPr lang="en-US" dirty="0"/>
           </a:p>
@@ -5277,7 +5273,7 @@
           <a:p>
             <a:fld id="{9FC26D47-47D1-43CB-B8F4-8F81031308A2}" type="datetime1">
               <a:rPr lang="en-US" smtClean="0"/>
-              <a:t>5/26/2020</a:t>
+              <a:t>6/9/2020</a:t>
             </a:fld>
             <a:endParaRPr lang="en-US" dirty="0"/>
           </a:p>
@@ -5517,7 +5513,7 @@
           <a:p>
             <a:fld id="{9FC26D47-47D1-43CB-B8F4-8F81031308A2}" type="datetime1">
               <a:rPr lang="en-US" smtClean="0"/>
-              <a:t>5/26/2020</a:t>
+              <a:t>6/9/2020</a:t>
             </a:fld>
             <a:endParaRPr lang="en-US" dirty="0"/>
           </a:p>
@@ -5631,7 +5627,7 @@
           <a:p>
             <a:fld id="{2C64FF30-30D9-4AF4-87A5-F2ED6450066E}" type="datetime1">
               <a:rPr lang="en-US" smtClean="0"/>
-              <a:t>5/26/2020</a:t>
+              <a:t>6/9/2020</a:t>
             </a:fld>
             <a:endParaRPr lang="en-US" dirty="0"/>
           </a:p>
@@ -5895,7 +5891,7 @@
           <a:p>
             <a:fld id="{9FC26D47-47D1-43CB-B8F4-8F81031308A2}" type="datetime1">
               <a:rPr lang="en-US" smtClean="0"/>
-              <a:t>5/26/2020</a:t>
+              <a:t>6/9/2020</a:t>
             </a:fld>
             <a:endParaRPr lang="en-US" dirty="0"/>
           </a:p>
@@ -6085,10 +6081,9 @@
           <a:lstStyle/>
           <a:p>
             <a:r>
-              <a:rPr lang="en-US"/>
+              <a:rPr lang="en-US" dirty="0"/>
               <a:t>Data import in R</a:t>
             </a:r>
-            <a:endParaRPr lang="en-US" dirty="0"/>
           </a:p>
         </p:txBody>
       </p:sp>
@@ -6096,6 +6091,565 @@
     <p:extLst>
       <p:ext uri="{BB962C8B-B14F-4D97-AF65-F5344CB8AC3E}">
         <p14:creationId xmlns:p14="http://schemas.microsoft.com/office/powerpoint/2010/main" val="3902812083"/>
+      </p:ext>
+    </p:extLst>
+  </p:cSld>
+  <p:clrMapOvr>
+    <a:masterClrMapping/>
+  </p:clrMapOvr>
+</p:sld>
+</file>
+
+<file path=ppt/slides/slide22.xml><?xml version="1.0" encoding="utf-8"?>
+<p:sld xmlns:a="http://schemas.openxmlformats.org/drawingml/2006/main" xmlns:r="http://schemas.openxmlformats.org/officeDocument/2006/relationships" xmlns:p="http://schemas.openxmlformats.org/presentationml/2006/main">
+  <p:cSld>
+    <p:spTree>
+      <p:nvGrpSpPr>
+        <p:cNvPr id="1" name=""/>
+        <p:cNvGrpSpPr/>
+        <p:nvPr/>
+      </p:nvGrpSpPr>
+      <p:grpSpPr>
+        <a:xfrm>
+          <a:off x="0" y="0"/>
+          <a:ext cx="0" cy="0"/>
+          <a:chOff x="0" y="0"/>
+          <a:chExt cx="0" cy="0"/>
+        </a:xfrm>
+      </p:grpSpPr>
+      <p:sp>
+        <p:nvSpPr>
+          <p:cNvPr id="2" name="Titel 1">
+            <a:extLst>
+              <a:ext uri="{FF2B5EF4-FFF2-40B4-BE49-F238E27FC236}">
+                <a16:creationId xmlns:a16="http://schemas.microsoft.com/office/drawing/2014/main" id="{338F186B-42FB-4377-9439-4BD4CD4D995F}"/>
+              </a:ext>
+            </a:extLst>
+          </p:cNvPr>
+          <p:cNvSpPr>
+            <a:spLocks noGrp="1"/>
+          </p:cNvSpPr>
+          <p:nvPr>
+            <p:ph type="title"/>
+          </p:nvPr>
+        </p:nvSpPr>
+        <p:spPr/>
+        <p:txBody>
+          <a:bodyPr/>
+          <a:lstStyle/>
+          <a:p>
+            <a:r>
+              <a:rPr lang="en-US" dirty="0"/>
+              <a:t>Data import in R</a:t>
+            </a:r>
+          </a:p>
+        </p:txBody>
+      </p:sp>
+      <p:sp>
+        <p:nvSpPr>
+          <p:cNvPr id="3" name="Inhaltsplatzhalter 2">
+            <a:extLst>
+              <a:ext uri="{FF2B5EF4-FFF2-40B4-BE49-F238E27FC236}">
+                <a16:creationId xmlns:a16="http://schemas.microsoft.com/office/drawing/2014/main" id="{6855CDB6-B6EF-4181-81B4-EE8AEF68E783}"/>
+              </a:ext>
+            </a:extLst>
+          </p:cNvPr>
+          <p:cNvSpPr>
+            <a:spLocks noGrp="1"/>
+          </p:cNvSpPr>
+          <p:nvPr>
+            <p:ph idx="1"/>
+          </p:nvPr>
+        </p:nvSpPr>
+        <p:spPr>
+          <a:xfrm>
+            <a:off x="911224" y="2205039"/>
+            <a:ext cx="10009311" cy="3887787"/>
+          </a:xfrm>
+        </p:spPr>
+        <p:txBody>
+          <a:bodyPr/>
+          <a:lstStyle/>
+          <a:p>
+            <a:pPr lvl="1"/>
+            <a:r>
+              <a:rPr lang="en-US" dirty="0"/>
+              <a:t>You can save R objects (e.g. a </a:t>
+            </a:r>
+            <a:r>
+              <a:rPr lang="en-US" dirty="0" err="1"/>
+              <a:t>dataframe</a:t>
+            </a:r>
+            <a:r>
+              <a:rPr lang="en-US" dirty="0"/>
+              <a:t>) in in .</a:t>
+            </a:r>
+            <a:r>
+              <a:rPr lang="en-US" dirty="0" err="1"/>
+              <a:t>Rda</a:t>
+            </a:r>
+            <a:r>
+              <a:rPr lang="en-US" dirty="0"/>
+              <a:t>-files</a:t>
+            </a:r>
+          </a:p>
+          <a:p>
+            <a:pPr lvl="1"/>
+            <a:r>
+              <a:rPr lang="en-US" dirty="0"/>
+              <a:t>You use “load()” to import an .</a:t>
+            </a:r>
+            <a:r>
+              <a:rPr lang="en-US" dirty="0" err="1"/>
+              <a:t>Rda</a:t>
+            </a:r>
+            <a:r>
+              <a:rPr lang="en-US" dirty="0"/>
+              <a:t> file into R.</a:t>
+            </a:r>
+          </a:p>
+          <a:p>
+            <a:pPr lvl="1"/>
+            <a:endParaRPr lang="en-US" dirty="0"/>
+          </a:p>
+          <a:p>
+            <a:pPr lvl="1"/>
+            <a:r>
+              <a:rPr lang="en-US" dirty="0"/>
+              <a:t>Most datasets will not be prepared for R (e.g. .csv-files, Excel files, etc.) and we will learn in the next exercise more about those ways.</a:t>
+            </a:r>
+          </a:p>
+          <a:p>
+            <a:pPr lvl="1"/>
+            <a:endParaRPr lang="en-US" dirty="0"/>
+          </a:p>
+          <a:p>
+            <a:pPr lvl="1"/>
+            <a:endParaRPr lang="en-US" dirty="0"/>
+          </a:p>
+        </p:txBody>
+      </p:sp>
+      <p:sp>
+        <p:nvSpPr>
+          <p:cNvPr id="5" name="Datumsplatzhalter 4">
+            <a:extLst>
+              <a:ext uri="{FF2B5EF4-FFF2-40B4-BE49-F238E27FC236}">
+                <a16:creationId xmlns:a16="http://schemas.microsoft.com/office/drawing/2014/main" id="{AF979624-E89D-4E82-AD6E-D6A59CDAE51C}"/>
+              </a:ext>
+            </a:extLst>
+          </p:cNvPr>
+          <p:cNvSpPr>
+            <a:spLocks noGrp="1"/>
+          </p:cNvSpPr>
+          <p:nvPr>
+            <p:ph type="dt" sz="half" idx="14"/>
+          </p:nvPr>
+        </p:nvSpPr>
+        <p:spPr/>
+        <p:txBody>
+          <a:bodyPr/>
+          <a:lstStyle/>
+          <a:p>
+            <a:fld id="{C094B626-20B6-4801-A2CE-25AC90736E47}" type="datetime1">
+              <a:rPr lang="en-US" smtClean="0"/>
+              <a:t>6/9/2020</a:t>
+            </a:fld>
+            <a:endParaRPr lang="en-US" dirty="0"/>
+          </a:p>
+        </p:txBody>
+      </p:sp>
+      <p:sp>
+        <p:nvSpPr>
+          <p:cNvPr id="6" name="Fußzeilenplatzhalter 5">
+            <a:extLst>
+              <a:ext uri="{FF2B5EF4-FFF2-40B4-BE49-F238E27FC236}">
+                <a16:creationId xmlns:a16="http://schemas.microsoft.com/office/drawing/2014/main" id="{6553E4A7-69F1-433C-967D-0C8254B4BD69}"/>
+              </a:ext>
+            </a:extLst>
+          </p:cNvPr>
+          <p:cNvSpPr>
+            <a:spLocks noGrp="1"/>
+          </p:cNvSpPr>
+          <p:nvPr>
+            <p:ph type="ftr" sz="quarter" idx="15"/>
+          </p:nvPr>
+        </p:nvSpPr>
+        <p:spPr/>
+        <p:txBody>
+          <a:bodyPr/>
+          <a:lstStyle/>
+          <a:p>
+            <a:r>
+              <a:rPr lang="en-US"/>
+              <a:t>Foundations of Data Science, Exercise 2</a:t>
+            </a:r>
+            <a:endParaRPr lang="en-US" dirty="0"/>
+          </a:p>
+        </p:txBody>
+      </p:sp>
+      <p:sp>
+        <p:nvSpPr>
+          <p:cNvPr id="7" name="Foliennummernplatzhalter 6">
+            <a:extLst>
+              <a:ext uri="{FF2B5EF4-FFF2-40B4-BE49-F238E27FC236}">
+                <a16:creationId xmlns:a16="http://schemas.microsoft.com/office/drawing/2014/main" id="{4D0B0E17-08EC-48AB-BF4C-F2B6AE2C7277}"/>
+              </a:ext>
+            </a:extLst>
+          </p:cNvPr>
+          <p:cNvSpPr>
+            <a:spLocks noGrp="1"/>
+          </p:cNvSpPr>
+          <p:nvPr>
+            <p:ph type="sldNum" sz="quarter" idx="16"/>
+          </p:nvPr>
+        </p:nvSpPr>
+        <p:spPr/>
+        <p:txBody>
+          <a:bodyPr/>
+          <a:lstStyle/>
+          <a:p>
+            <a:r>
+              <a:rPr lang="en-US"/>
+              <a:t>Page </a:t>
+            </a:r>
+            <a:fld id="{9D46F3A4-F478-9440-BC8E-B732027F4C86}" type="slidenum">
+              <a:rPr lang="en-US" smtClean="0"/>
+              <a:pPr/>
+              <a:t>22</a:t>
+            </a:fld>
+            <a:endParaRPr lang="en-US" dirty="0"/>
+          </a:p>
+        </p:txBody>
+      </p:sp>
+    </p:spTree>
+    <p:extLst>
+      <p:ext uri="{BB962C8B-B14F-4D97-AF65-F5344CB8AC3E}">
+        <p14:creationId xmlns:p14="http://schemas.microsoft.com/office/powerpoint/2010/main" val="3514294626"/>
+      </p:ext>
+    </p:extLst>
+  </p:cSld>
+  <p:clrMapOvr>
+    <a:masterClrMapping/>
+  </p:clrMapOvr>
+</p:sld>
+</file>
+
+<file path=ppt/slides/slide23.xml><?xml version="1.0" encoding="utf-8"?>
+<p:sld xmlns:a="http://schemas.openxmlformats.org/drawingml/2006/main" xmlns:r="http://schemas.openxmlformats.org/officeDocument/2006/relationships" xmlns:p="http://schemas.openxmlformats.org/presentationml/2006/main">
+  <p:cSld>
+    <p:spTree>
+      <p:nvGrpSpPr>
+        <p:cNvPr id="1" name=""/>
+        <p:cNvGrpSpPr/>
+        <p:nvPr/>
+      </p:nvGrpSpPr>
+      <p:grpSpPr>
+        <a:xfrm>
+          <a:off x="0" y="0"/>
+          <a:ext cx="0" cy="0"/>
+          <a:chOff x="0" y="0"/>
+          <a:chExt cx="0" cy="0"/>
+        </a:xfrm>
+      </p:grpSpPr>
+      <p:sp>
+        <p:nvSpPr>
+          <p:cNvPr id="2" name="Titel 1">
+            <a:extLst>
+              <a:ext uri="{FF2B5EF4-FFF2-40B4-BE49-F238E27FC236}">
+                <a16:creationId xmlns:a16="http://schemas.microsoft.com/office/drawing/2014/main" id="{338F186B-42FB-4377-9439-4BD4CD4D995F}"/>
+              </a:ext>
+            </a:extLst>
+          </p:cNvPr>
+          <p:cNvSpPr>
+            <a:spLocks noGrp="1"/>
+          </p:cNvSpPr>
+          <p:nvPr>
+            <p:ph type="title"/>
+          </p:nvPr>
+        </p:nvSpPr>
+        <p:spPr/>
+        <p:txBody>
+          <a:bodyPr/>
+          <a:lstStyle/>
+          <a:p>
+            <a:r>
+              <a:rPr lang="en-US"/>
+              <a:t>Outlook</a:t>
+            </a:r>
+            <a:endParaRPr lang="en-US" dirty="0"/>
+          </a:p>
+        </p:txBody>
+      </p:sp>
+      <p:sp>
+        <p:nvSpPr>
+          <p:cNvPr id="3" name="Inhaltsplatzhalter 2">
+            <a:extLst>
+              <a:ext uri="{FF2B5EF4-FFF2-40B4-BE49-F238E27FC236}">
+                <a16:creationId xmlns:a16="http://schemas.microsoft.com/office/drawing/2014/main" id="{6855CDB6-B6EF-4181-81B4-EE8AEF68E783}"/>
+              </a:ext>
+            </a:extLst>
+          </p:cNvPr>
+          <p:cNvSpPr>
+            <a:spLocks noGrp="1"/>
+          </p:cNvSpPr>
+          <p:nvPr>
+            <p:ph idx="1"/>
+          </p:nvPr>
+        </p:nvSpPr>
+        <p:spPr>
+          <a:xfrm>
+            <a:off x="911224" y="2205039"/>
+            <a:ext cx="10009311" cy="3887787"/>
+          </a:xfrm>
+        </p:spPr>
+        <p:txBody>
+          <a:bodyPr/>
+          <a:lstStyle/>
+          <a:p>
+            <a:pPr lvl="1"/>
+            <a:r>
+              <a:rPr lang="en-US" dirty="0"/>
+              <a:t>There are many packages suitable to load specific types of data into R:</a:t>
+            </a:r>
+          </a:p>
+          <a:p>
+            <a:pPr lvl="2"/>
+            <a:r>
+              <a:rPr lang="en-US" b="1" dirty="0" err="1"/>
+              <a:t>jsonlite</a:t>
+            </a:r>
+            <a:r>
+              <a:rPr lang="en-US" dirty="0"/>
+              <a:t>: for JSON data</a:t>
+            </a:r>
+          </a:p>
+          <a:p>
+            <a:pPr lvl="2"/>
+            <a:r>
+              <a:rPr lang="en-US" b="1" dirty="0"/>
+              <a:t>xml2</a:t>
+            </a:r>
+            <a:r>
+              <a:rPr lang="en-US" dirty="0"/>
+              <a:t>: for XML data</a:t>
+            </a:r>
+          </a:p>
+          <a:p>
+            <a:pPr lvl="2"/>
+            <a:r>
+              <a:rPr lang="en-US" b="1" dirty="0" err="1"/>
+              <a:t>readr</a:t>
+            </a:r>
+            <a:r>
+              <a:rPr lang="en-US" dirty="0"/>
+              <a:t>: for Text data</a:t>
+            </a:r>
+          </a:p>
+          <a:p>
+            <a:pPr lvl="2"/>
+            <a:r>
+              <a:rPr lang="en-US" b="1" dirty="0"/>
+              <a:t>haven</a:t>
+            </a:r>
+            <a:r>
+              <a:rPr lang="en-US" dirty="0"/>
+              <a:t>: for SPSS, SAS, Stata files</a:t>
+            </a:r>
+          </a:p>
+          <a:p>
+            <a:pPr lvl="2"/>
+            <a:r>
+              <a:rPr lang="en-US" b="1" dirty="0" err="1"/>
+              <a:t>readxl</a:t>
+            </a:r>
+            <a:r>
+              <a:rPr lang="en-US" dirty="0"/>
+              <a:t>: for Microsoft excel files (.</a:t>
+            </a:r>
+            <a:r>
+              <a:rPr lang="en-US" dirty="0" err="1"/>
+              <a:t>xls</a:t>
+            </a:r>
+            <a:r>
+              <a:rPr lang="en-US" dirty="0"/>
+              <a:t> or .xlsx)</a:t>
+            </a:r>
+          </a:p>
+          <a:p>
+            <a:pPr lvl="2"/>
+            <a:r>
+              <a:rPr lang="en-US" b="1" dirty="0"/>
+              <a:t>DBI</a:t>
+            </a:r>
+            <a:r>
+              <a:rPr lang="en-US" dirty="0"/>
+              <a:t>: for connections to data bases</a:t>
+            </a:r>
+          </a:p>
+          <a:p>
+            <a:pPr lvl="2"/>
+            <a:r>
+              <a:rPr lang="en-US" b="1" dirty="0" err="1"/>
+              <a:t>httr</a:t>
+            </a:r>
+            <a:r>
+              <a:rPr lang="en-US" dirty="0"/>
+              <a:t>: to retrieve data from APIs</a:t>
+            </a:r>
+          </a:p>
+          <a:p>
+            <a:pPr lvl="2"/>
+            <a:r>
+              <a:rPr lang="en-US" b="1" dirty="0" err="1"/>
+              <a:t>rvest</a:t>
+            </a:r>
+            <a:r>
+              <a:rPr lang="en-US" dirty="0"/>
+              <a:t>: to retrieve data from websites/html</a:t>
+            </a:r>
+          </a:p>
+          <a:p>
+            <a:pPr lvl="1"/>
+            <a:endParaRPr lang="en-US" dirty="0"/>
+          </a:p>
+          <a:p>
+            <a:pPr lvl="1"/>
+            <a:endParaRPr lang="en-US" dirty="0"/>
+          </a:p>
+        </p:txBody>
+      </p:sp>
+      <p:sp>
+        <p:nvSpPr>
+          <p:cNvPr id="5" name="Datumsplatzhalter 4">
+            <a:extLst>
+              <a:ext uri="{FF2B5EF4-FFF2-40B4-BE49-F238E27FC236}">
+                <a16:creationId xmlns:a16="http://schemas.microsoft.com/office/drawing/2014/main" id="{AF979624-E89D-4E82-AD6E-D6A59CDAE51C}"/>
+              </a:ext>
+            </a:extLst>
+          </p:cNvPr>
+          <p:cNvSpPr>
+            <a:spLocks noGrp="1"/>
+          </p:cNvSpPr>
+          <p:nvPr>
+            <p:ph type="dt" sz="half" idx="14"/>
+          </p:nvPr>
+        </p:nvSpPr>
+        <p:spPr/>
+        <p:txBody>
+          <a:bodyPr/>
+          <a:lstStyle/>
+          <a:p>
+            <a:fld id="{C094B626-20B6-4801-A2CE-25AC90736E47}" type="datetime1">
+              <a:rPr lang="en-US" smtClean="0"/>
+              <a:t>6/9/2020</a:t>
+            </a:fld>
+            <a:endParaRPr lang="en-US" dirty="0"/>
+          </a:p>
+        </p:txBody>
+      </p:sp>
+      <p:sp>
+        <p:nvSpPr>
+          <p:cNvPr id="6" name="Fußzeilenplatzhalter 5">
+            <a:extLst>
+              <a:ext uri="{FF2B5EF4-FFF2-40B4-BE49-F238E27FC236}">
+                <a16:creationId xmlns:a16="http://schemas.microsoft.com/office/drawing/2014/main" id="{6553E4A7-69F1-433C-967D-0C8254B4BD69}"/>
+              </a:ext>
+            </a:extLst>
+          </p:cNvPr>
+          <p:cNvSpPr>
+            <a:spLocks noGrp="1"/>
+          </p:cNvSpPr>
+          <p:nvPr>
+            <p:ph type="ftr" sz="quarter" idx="15"/>
+          </p:nvPr>
+        </p:nvSpPr>
+        <p:spPr/>
+        <p:txBody>
+          <a:bodyPr/>
+          <a:lstStyle/>
+          <a:p>
+            <a:r>
+              <a:rPr lang="en-US"/>
+              <a:t>Foundations of Data Science, Exercise 2</a:t>
+            </a:r>
+            <a:endParaRPr lang="en-US" dirty="0"/>
+          </a:p>
+        </p:txBody>
+      </p:sp>
+      <p:sp>
+        <p:nvSpPr>
+          <p:cNvPr id="7" name="Foliennummernplatzhalter 6">
+            <a:extLst>
+              <a:ext uri="{FF2B5EF4-FFF2-40B4-BE49-F238E27FC236}">
+                <a16:creationId xmlns:a16="http://schemas.microsoft.com/office/drawing/2014/main" id="{4D0B0E17-08EC-48AB-BF4C-F2B6AE2C7277}"/>
+              </a:ext>
+            </a:extLst>
+          </p:cNvPr>
+          <p:cNvSpPr>
+            <a:spLocks noGrp="1"/>
+          </p:cNvSpPr>
+          <p:nvPr>
+            <p:ph type="sldNum" sz="quarter" idx="16"/>
+          </p:nvPr>
+        </p:nvSpPr>
+        <p:spPr/>
+        <p:txBody>
+          <a:bodyPr/>
+          <a:lstStyle/>
+          <a:p>
+            <a:r>
+              <a:rPr lang="en-US"/>
+              <a:t>Page </a:t>
+            </a:r>
+            <a:fld id="{9D46F3A4-F478-9440-BC8E-B732027F4C86}" type="slidenum">
+              <a:rPr lang="en-US" smtClean="0"/>
+              <a:pPr/>
+              <a:t>23</a:t>
+            </a:fld>
+            <a:endParaRPr lang="en-US" dirty="0"/>
+          </a:p>
+        </p:txBody>
+      </p:sp>
+      <p:sp>
+        <p:nvSpPr>
+          <p:cNvPr id="10" name="Textfeld 9">
+            <a:extLst>
+              <a:ext uri="{FF2B5EF4-FFF2-40B4-BE49-F238E27FC236}">
+                <a16:creationId xmlns:a16="http://schemas.microsoft.com/office/drawing/2014/main" id="{7680E779-C42F-4C53-A5FD-FA3E067921E4}"/>
+              </a:ext>
+            </a:extLst>
+          </p:cNvPr>
+          <p:cNvSpPr txBox="1"/>
+          <p:nvPr/>
+        </p:nvSpPr>
+        <p:spPr>
+          <a:xfrm>
+            <a:off x="6084731" y="3252028"/>
+            <a:ext cx="5976664" cy="353943"/>
+          </a:xfrm>
+          <a:prstGeom prst="rect">
+            <a:avLst/>
+          </a:prstGeom>
+          <a:noFill/>
+        </p:spPr>
+        <p:txBody>
+          <a:bodyPr wrap="square" rtlCol="0">
+            <a:spAutoFit/>
+          </a:bodyPr>
+          <a:lstStyle/>
+          <a:p>
+            <a:pPr lvl="0" eaLnBrk="0" hangingPunct="0">
+              <a:buFontTx/>
+              <a:buChar char="•"/>
+            </a:pPr>
+            <a:endParaRPr lang="en-US" dirty="0"/>
+          </a:p>
+        </p:txBody>
+      </p:sp>
+    </p:spTree>
+    <p:extLst>
+      <p:ext uri="{BB962C8B-B14F-4D97-AF65-F5344CB8AC3E}">
+        <p14:creationId xmlns:p14="http://schemas.microsoft.com/office/powerpoint/2010/main" val="2239460122"/>
       </p:ext>
     </p:extLst>
   </p:cSld>
@@ -6223,6 +6777,18 @@
           <a:bodyPr/>
           <a:lstStyle/>
           <a:p>
+            <a:pPr marL="0" indent="0">
+              <a:buNone/>
+            </a:pPr>
+            <a:r>
+              <a:rPr lang="en-US" b="1" i="1" dirty="0"/>
+              <a:t>“Make sense of new and/or large data and communicate insight”</a:t>
+            </a:r>
+          </a:p>
+          <a:p>
+            <a:endParaRPr lang="en-US" dirty="0"/>
+          </a:p>
+          <a:p>
             <a:r>
               <a:rPr lang="en-US" dirty="0"/>
               <a:t>Access innovative and large data resources</a:t>
@@ -6271,7 +6837,7 @@
           <a:p>
             <a:fld id="{798CF5D1-7599-499B-8C51-5750945D6C85}" type="datetime1">
               <a:rPr lang="en-US" smtClean="0"/>
-              <a:t>5/26/2020</a:t>
+              <a:t>6/9/2020</a:t>
             </a:fld>
             <a:endParaRPr lang="en-US" dirty="0"/>
           </a:p>
@@ -6545,7 +7111,7 @@
           <a:p>
             <a:fld id="{CF65F6CC-1189-45FF-8DC9-0A607B47AED4}" type="datetime1">
               <a:rPr lang="en-US" smtClean="0"/>
-              <a:t>5/26/2020</a:t>
+              <a:t>6/9/2020</a:t>
             </a:fld>
             <a:endParaRPr lang="en-US" dirty="0"/>
           </a:p>
@@ -6733,13 +7299,6 @@
           </a:p>
           <a:p>
             <a:pPr lvl="2"/>
-            <a:r>
-              <a:rPr lang="en-US" dirty="0"/>
-              <a:t>Academic pressure to publish original work</a:t>
-            </a:r>
-          </a:p>
-          <a:p>
-            <a:pPr lvl="2"/>
             <a:endParaRPr lang="en-US" dirty="0"/>
           </a:p>
           <a:p>
@@ -6774,7 +7333,7 @@
           <a:p>
             <a:fld id="{4CD2A09E-96F7-4913-94F8-D1412C10CCD9}" type="datetime1">
               <a:rPr lang="en-US" smtClean="0"/>
-              <a:t>5/26/2020</a:t>
+              <a:t>6/9/2020</a:t>
             </a:fld>
             <a:endParaRPr lang="en-US" dirty="0"/>
           </a:p>
@@ -7028,7 +7587,7 @@
           <a:p>
             <a:fld id="{F3779014-E915-489E-B377-E60C55E8660A}" type="datetime1">
               <a:rPr lang="en-US" smtClean="0"/>
-              <a:t>5/26/2020</a:t>
+              <a:t>6/9/2020</a:t>
             </a:fld>
             <a:endParaRPr lang="en-US" dirty="0"/>
           </a:p>
@@ -7348,7 +7907,7 @@
           <a:p>
             <a:fld id="{9C311F4B-081C-471E-9159-32D9CD5E3DFA}" type="datetime1">
               <a:rPr lang="en-US" smtClean="0"/>
-              <a:t>5/26/2020</a:t>
+              <a:t>6/9/2020</a:t>
             </a:fld>
             <a:endParaRPr lang="en-US" dirty="0"/>
           </a:p>

</xml_diff>

<commit_message>
slight adaptions to fonts and addition of csv
</commit_message>
<xml_diff>
--- a/ex1/ex1.pptx
+++ b/ex1/ex1.pptx
@@ -288,17 +288,17 @@
           <a:effectLst/>
           <a:extLst>
             <a:ext uri="{FAA26D3D-D897-4be2-8F04-BA451C77F1D7}">
-              <ma14:placeholderFlag xmlns:ma14="http://schemas.microsoft.com/office/mac/drawingml/2011/main" xmlns="" val="1"/>
+              <ma14:placeholderFlag xmlns="" xmlns:ma14="http://schemas.microsoft.com/office/mac/drawingml/2011/main" val="1"/>
             </a:ext>
             <a:ext uri="{909E8E84-426E-40dd-AFC4-6F175D3DCCD1}">
-              <a14:hiddenFill xmlns="" xmlns:a14="http://schemas.microsoft.com/office/drawing/2010/main">
+              <a14:hiddenFill xmlns:a14="http://schemas.microsoft.com/office/drawing/2010/main" xmlns="">
                 <a:solidFill>
                   <a:schemeClr val="accent1"/>
                 </a:solidFill>
               </a14:hiddenFill>
             </a:ext>
             <a:ext uri="{91240B29-F687-4f45-9708-019B960494DF}">
-              <a14:hiddenLine xmlns="" xmlns:a14="http://schemas.microsoft.com/office/drawing/2010/main" w="9525">
+              <a14:hiddenLine xmlns:a14="http://schemas.microsoft.com/office/drawing/2010/main" xmlns="" w="9525">
                 <a:solidFill>
                   <a:schemeClr val="tx1"/>
                 </a:solidFill>
@@ -308,7 +308,7 @@
               </a14:hiddenLine>
             </a:ext>
             <a:ext uri="{AF507438-7753-43e0-B8FC-AC1667EBCBE1}">
-              <a14:hiddenEffects xmlns="" xmlns:a14="http://schemas.microsoft.com/office/drawing/2010/main">
+              <a14:hiddenEffects xmlns:a14="http://schemas.microsoft.com/office/drawing/2010/main" xmlns="">
                 <a:effectLst>
                   <a:outerShdw blurRad="63500" dist="38099" dir="2700000" algn="ctr" rotWithShape="0">
                     <a:schemeClr val="bg2">
@@ -361,17 +361,17 @@
           <a:effectLst/>
           <a:extLst>
             <a:ext uri="{FAA26D3D-D897-4be2-8F04-BA451C77F1D7}">
-              <ma14:placeholderFlag xmlns:ma14="http://schemas.microsoft.com/office/mac/drawingml/2011/main" xmlns="" val="1"/>
+              <ma14:placeholderFlag xmlns="" xmlns:ma14="http://schemas.microsoft.com/office/mac/drawingml/2011/main" val="1"/>
             </a:ext>
             <a:ext uri="{909E8E84-426E-40dd-AFC4-6F175D3DCCD1}">
-              <a14:hiddenFill xmlns="" xmlns:a14="http://schemas.microsoft.com/office/drawing/2010/main">
+              <a14:hiddenFill xmlns:a14="http://schemas.microsoft.com/office/drawing/2010/main" xmlns="">
                 <a:solidFill>
                   <a:schemeClr val="accent1"/>
                 </a:solidFill>
               </a14:hiddenFill>
             </a:ext>
             <a:ext uri="{91240B29-F687-4f45-9708-019B960494DF}">
-              <a14:hiddenLine xmlns="" xmlns:a14="http://schemas.microsoft.com/office/drawing/2010/main" w="9525">
+              <a14:hiddenLine xmlns:a14="http://schemas.microsoft.com/office/drawing/2010/main" xmlns="" w="9525">
                 <a:solidFill>
                   <a:schemeClr val="tx1"/>
                 </a:solidFill>
@@ -381,7 +381,7 @@
               </a14:hiddenLine>
             </a:ext>
             <a:ext uri="{AF507438-7753-43e0-B8FC-AC1667EBCBE1}">
-              <a14:hiddenEffects xmlns="" xmlns:a14="http://schemas.microsoft.com/office/drawing/2010/main">
+              <a14:hiddenEffects xmlns:a14="http://schemas.microsoft.com/office/drawing/2010/main" xmlns="">
                 <a:effectLst>
                   <a:outerShdw blurRad="63500" dist="38099" dir="2700000" algn="ctr" rotWithShape="0">
                     <a:schemeClr val="bg2">
@@ -439,7 +439,7 @@
           <a:effectLst/>
           <a:extLst>
             <a:ext uri="{AF507438-7753-43e0-B8FC-AC1667EBCBE1}">
-              <a14:hiddenEffects xmlns="" xmlns:a14="http://schemas.microsoft.com/office/drawing/2010/main">
+              <a14:hiddenEffects xmlns:a14="http://schemas.microsoft.com/office/drawing/2010/main" xmlns="">
                 <a:effectLst>
                   <a:outerShdw blurRad="63500" dist="38099" dir="2700000" algn="ctr" rotWithShape="0">
                     <a:srgbClr val="000000">
@@ -450,7 +450,7 @@
               </a14:hiddenEffects>
             </a:ext>
             <a:ext uri="{53640926-AAD7-44d8-BBD7-CCE9431645EC}">
-              <a14:shadowObscured xmlns="" xmlns:a14="http://schemas.microsoft.com/office/drawing/2010/main" val="1"/>
+              <a14:shadowObscured xmlns:a14="http://schemas.microsoft.com/office/drawing/2010/main" xmlns="" val="1"/>
             </a:ext>
           </a:extLst>
         </p:spPr>
@@ -480,17 +480,17 @@
           <a:effectLst/>
           <a:extLst>
             <a:ext uri="{FAA26D3D-D897-4be2-8F04-BA451C77F1D7}">
-              <ma14:placeholderFlag xmlns:ma14="http://schemas.microsoft.com/office/mac/drawingml/2011/main" xmlns="" val="1"/>
+              <ma14:placeholderFlag xmlns="" xmlns:ma14="http://schemas.microsoft.com/office/mac/drawingml/2011/main" val="1"/>
             </a:ext>
             <a:ext uri="{909E8E84-426E-40dd-AFC4-6F175D3DCCD1}">
-              <a14:hiddenFill xmlns="" xmlns:a14="http://schemas.microsoft.com/office/drawing/2010/main">
+              <a14:hiddenFill xmlns:a14="http://schemas.microsoft.com/office/drawing/2010/main" xmlns="">
                 <a:solidFill>
                   <a:schemeClr val="accent1"/>
                 </a:solidFill>
               </a14:hiddenFill>
             </a:ext>
             <a:ext uri="{91240B29-F687-4f45-9708-019B960494DF}">
-              <a14:hiddenLine xmlns="" xmlns:a14="http://schemas.microsoft.com/office/drawing/2010/main" w="9525">
+              <a14:hiddenLine xmlns:a14="http://schemas.microsoft.com/office/drawing/2010/main" xmlns="" w="9525">
                 <a:solidFill>
                   <a:schemeClr val="tx1"/>
                 </a:solidFill>
@@ -500,7 +500,7 @@
               </a14:hiddenLine>
             </a:ext>
             <a:ext uri="{AF507438-7753-43e0-B8FC-AC1667EBCBE1}">
-              <a14:hiddenEffects xmlns="" xmlns:a14="http://schemas.microsoft.com/office/drawing/2010/main">
+              <a14:hiddenEffects xmlns:a14="http://schemas.microsoft.com/office/drawing/2010/main" xmlns="">
                 <a:effectLst>
                   <a:outerShdw blurRad="63500" dist="38099" dir="2700000" algn="ctr" rotWithShape="0">
                     <a:schemeClr val="bg2">
@@ -581,17 +581,17 @@
           <a:effectLst/>
           <a:extLst>
             <a:ext uri="{FAA26D3D-D897-4be2-8F04-BA451C77F1D7}">
-              <ma14:placeholderFlag xmlns:ma14="http://schemas.microsoft.com/office/mac/drawingml/2011/main" xmlns="" val="1"/>
+              <ma14:placeholderFlag xmlns="" xmlns:ma14="http://schemas.microsoft.com/office/mac/drawingml/2011/main" val="1"/>
             </a:ext>
             <a:ext uri="{909E8E84-426E-40dd-AFC4-6F175D3DCCD1}">
-              <a14:hiddenFill xmlns="" xmlns:a14="http://schemas.microsoft.com/office/drawing/2010/main">
+              <a14:hiddenFill xmlns:a14="http://schemas.microsoft.com/office/drawing/2010/main" xmlns="">
                 <a:solidFill>
                   <a:schemeClr val="accent1"/>
                 </a:solidFill>
               </a14:hiddenFill>
             </a:ext>
             <a:ext uri="{91240B29-F687-4f45-9708-019B960494DF}">
-              <a14:hiddenLine xmlns="" xmlns:a14="http://schemas.microsoft.com/office/drawing/2010/main" w="9525">
+              <a14:hiddenLine xmlns:a14="http://schemas.microsoft.com/office/drawing/2010/main" xmlns="" w="9525">
                 <a:solidFill>
                   <a:schemeClr val="tx1"/>
                 </a:solidFill>
@@ -601,7 +601,7 @@
               </a14:hiddenLine>
             </a:ext>
             <a:ext uri="{AF507438-7753-43e0-B8FC-AC1667EBCBE1}">
-              <a14:hiddenEffects xmlns="" xmlns:a14="http://schemas.microsoft.com/office/drawing/2010/main">
+              <a14:hiddenEffects xmlns:a14="http://schemas.microsoft.com/office/drawing/2010/main" xmlns="">
                 <a:effectLst>
                   <a:outerShdw blurRad="63500" dist="38099" dir="2700000" algn="ctr" rotWithShape="0">
                     <a:schemeClr val="bg2">
@@ -654,17 +654,17 @@
           <a:effectLst/>
           <a:extLst>
             <a:ext uri="{FAA26D3D-D897-4be2-8F04-BA451C77F1D7}">
-              <ma14:placeholderFlag xmlns:ma14="http://schemas.microsoft.com/office/mac/drawingml/2011/main" xmlns="" val="1"/>
+              <ma14:placeholderFlag xmlns="" xmlns:ma14="http://schemas.microsoft.com/office/mac/drawingml/2011/main" val="1"/>
             </a:ext>
             <a:ext uri="{909E8E84-426E-40dd-AFC4-6F175D3DCCD1}">
-              <a14:hiddenFill xmlns="" xmlns:a14="http://schemas.microsoft.com/office/drawing/2010/main">
+              <a14:hiddenFill xmlns:a14="http://schemas.microsoft.com/office/drawing/2010/main" xmlns="">
                 <a:solidFill>
                   <a:schemeClr val="accent1"/>
                 </a:solidFill>
               </a14:hiddenFill>
             </a:ext>
             <a:ext uri="{91240B29-F687-4f45-9708-019B960494DF}">
-              <a14:hiddenLine xmlns="" xmlns:a14="http://schemas.microsoft.com/office/drawing/2010/main" w="9525">
+              <a14:hiddenLine xmlns:a14="http://schemas.microsoft.com/office/drawing/2010/main" xmlns="" w="9525">
                 <a:solidFill>
                   <a:schemeClr val="tx1"/>
                 </a:solidFill>
@@ -674,7 +674,7 @@
               </a14:hiddenLine>
             </a:ext>
             <a:ext uri="{AF507438-7753-43e0-B8FC-AC1667EBCBE1}">
-              <a14:hiddenEffects xmlns="" xmlns:a14="http://schemas.microsoft.com/office/drawing/2010/main">
+              <a14:hiddenEffects xmlns:a14="http://schemas.microsoft.com/office/drawing/2010/main" xmlns="">
                 <a:effectLst>
                   <a:outerShdw blurRad="63500" dist="38099" dir="2700000" algn="ctr" rotWithShape="0">
                     <a:schemeClr val="bg2">
@@ -1066,7 +1066,7 @@
           <a:effectLst/>
           <a:extLst>
             <a:ext uri="{AF507438-7753-43e0-B8FC-AC1667EBCBE1}">
-              <a14:hiddenEffects xmlns="" xmlns:a14="http://schemas.microsoft.com/office/drawing/2010/main">
+              <a14:hiddenEffects xmlns:a14="http://schemas.microsoft.com/office/drawing/2010/main" xmlns="">
                 <a:effectLst>
                   <a:outerShdw blurRad="63500" dist="35921" dir="2700000" algn="ctr" rotWithShape="0">
                     <a:schemeClr val="bg2"/>
@@ -1952,7 +1952,7 @@
           <a:noFill/>
           <a:extLst>
             <a:ext uri="{909E8E84-426E-40dd-AFC4-6F175D3DCCD1}">
-              <a14:hiddenFill xmlns="" xmlns:a14="http://schemas.microsoft.com/office/drawing/2010/main">
+              <a14:hiddenFill xmlns:a14="http://schemas.microsoft.com/office/drawing/2010/main" xmlns="">
                 <a:solidFill>
                   <a:srgbClr val="FFFFFF"/>
                 </a:solidFill>
@@ -1986,17 +1986,17 @@
           <a:effectLst/>
           <a:extLst>
             <a:ext uri="{FAA26D3D-D897-4be2-8F04-BA451C77F1D7}">
-              <ma14:placeholderFlag xmlns:ma14="http://schemas.microsoft.com/office/mac/drawingml/2011/main" xmlns="" val="1"/>
+              <ma14:placeholderFlag xmlns="" xmlns:ma14="http://schemas.microsoft.com/office/mac/drawingml/2011/main" val="1"/>
             </a:ext>
             <a:ext uri="{909E8E84-426E-40dd-AFC4-6F175D3DCCD1}">
-              <a14:hiddenFill xmlns="" xmlns:a14="http://schemas.microsoft.com/office/drawing/2010/main">
+              <a14:hiddenFill xmlns:a14="http://schemas.microsoft.com/office/drawing/2010/main" xmlns="">
                 <a:solidFill>
                   <a:schemeClr val="accent1"/>
                 </a:solidFill>
               </a14:hiddenFill>
             </a:ext>
             <a:ext uri="{91240B29-F687-4f45-9708-019B960494DF}">
-              <a14:hiddenLine xmlns="" xmlns:a14="http://schemas.microsoft.com/office/drawing/2010/main" w="9525">
+              <a14:hiddenLine xmlns:a14="http://schemas.microsoft.com/office/drawing/2010/main" xmlns="" w="9525">
                 <a:solidFill>
                   <a:schemeClr val="tx1"/>
                 </a:solidFill>
@@ -2006,7 +2006,7 @@
               </a14:hiddenLine>
             </a:ext>
             <a:ext uri="{AF507438-7753-43e0-B8FC-AC1667EBCBE1}">
-              <a14:hiddenEffects xmlns="" xmlns:a14="http://schemas.microsoft.com/office/drawing/2010/main">
+              <a14:hiddenEffects xmlns:a14="http://schemas.microsoft.com/office/drawing/2010/main" xmlns="">
                 <a:effectLst>
                   <a:outerShdw blurRad="63500" dist="38099" dir="2700000" algn="ctr" rotWithShape="0">
                     <a:schemeClr val="bg2">
@@ -2068,17 +2068,17 @@
           <a:effectLst/>
           <a:extLst>
             <a:ext uri="{FAA26D3D-D897-4be2-8F04-BA451C77F1D7}">
-              <ma14:placeholderFlag xmlns:ma14="http://schemas.microsoft.com/office/mac/drawingml/2011/main" xmlns="" val="1"/>
+              <ma14:placeholderFlag xmlns="" xmlns:ma14="http://schemas.microsoft.com/office/mac/drawingml/2011/main" val="1"/>
             </a:ext>
             <a:ext uri="{909E8E84-426E-40dd-AFC4-6F175D3DCCD1}">
-              <a14:hiddenFill xmlns="" xmlns:a14="http://schemas.microsoft.com/office/drawing/2010/main">
+              <a14:hiddenFill xmlns:a14="http://schemas.microsoft.com/office/drawing/2010/main" xmlns="">
                 <a:solidFill>
                   <a:schemeClr val="accent1"/>
                 </a:solidFill>
               </a14:hiddenFill>
             </a:ext>
             <a:ext uri="{91240B29-F687-4f45-9708-019B960494DF}">
-              <a14:hiddenLine xmlns="" xmlns:a14="http://schemas.microsoft.com/office/drawing/2010/main" w="9525">
+              <a14:hiddenLine xmlns:a14="http://schemas.microsoft.com/office/drawing/2010/main" xmlns="" w="9525">
                 <a:solidFill>
                   <a:schemeClr val="tx1"/>
                 </a:solidFill>
@@ -2088,7 +2088,7 @@
               </a14:hiddenLine>
             </a:ext>
             <a:ext uri="{AF507438-7753-43e0-B8FC-AC1667EBCBE1}">
-              <a14:hiddenEffects xmlns="" xmlns:a14="http://schemas.microsoft.com/office/drawing/2010/main">
+              <a14:hiddenEffects xmlns:a14="http://schemas.microsoft.com/office/drawing/2010/main" xmlns="">
                 <a:effectLst>
                   <a:outerShdw blurRad="63500" dist="38099" dir="2700000" algn="ctr" rotWithShape="0">
                     <a:schemeClr val="bg2">
@@ -2214,17 +2214,17 @@
           <a:effectLst/>
           <a:extLst>
             <a:ext uri="{FAA26D3D-D897-4be2-8F04-BA451C77F1D7}">
-              <ma14:placeholderFlag xmlns:ma14="http://schemas.microsoft.com/office/mac/drawingml/2011/main" xmlns="" val="1"/>
+              <ma14:placeholderFlag xmlns="" xmlns:ma14="http://schemas.microsoft.com/office/mac/drawingml/2011/main" val="1"/>
             </a:ext>
             <a:ext uri="{909E8E84-426E-40dd-AFC4-6F175D3DCCD1}">
-              <a14:hiddenFill xmlns="" xmlns:a14="http://schemas.microsoft.com/office/drawing/2010/main">
+              <a14:hiddenFill xmlns:a14="http://schemas.microsoft.com/office/drawing/2010/main" xmlns="">
                 <a:solidFill>
                   <a:schemeClr val="accent1"/>
                 </a:solidFill>
               </a14:hiddenFill>
             </a:ext>
             <a:ext uri="{91240B29-F687-4f45-9708-019B960494DF}">
-              <a14:hiddenLine xmlns="" xmlns:a14="http://schemas.microsoft.com/office/drawing/2010/main" w="9525">
+              <a14:hiddenLine xmlns:a14="http://schemas.microsoft.com/office/drawing/2010/main" xmlns="" w="9525">
                 <a:solidFill>
                   <a:schemeClr val="tx1"/>
                 </a:solidFill>
@@ -2234,7 +2234,7 @@
               </a14:hiddenLine>
             </a:ext>
             <a:ext uri="{AF507438-7753-43e0-B8FC-AC1667EBCBE1}">
-              <a14:hiddenEffects xmlns="" xmlns:a14="http://schemas.microsoft.com/office/drawing/2010/main">
+              <a14:hiddenEffects xmlns:a14="http://schemas.microsoft.com/office/drawing/2010/main" xmlns="">
                 <a:effectLst>
                   <a:outerShdw blurRad="63500" dist="38099" dir="2700000" algn="ctr" rotWithShape="0">
                     <a:schemeClr val="bg2">
@@ -2291,17 +2291,17 @@
           <a:effectLst/>
           <a:extLst>
             <a:ext uri="{FAA26D3D-D897-4be2-8F04-BA451C77F1D7}">
-              <ma14:placeholderFlag xmlns:ma14="http://schemas.microsoft.com/office/mac/drawingml/2011/main" xmlns="" val="1"/>
+              <ma14:placeholderFlag xmlns="" xmlns:ma14="http://schemas.microsoft.com/office/mac/drawingml/2011/main" val="1"/>
             </a:ext>
             <a:ext uri="{909E8E84-426E-40dd-AFC4-6F175D3DCCD1}">
-              <a14:hiddenFill xmlns="" xmlns:a14="http://schemas.microsoft.com/office/drawing/2010/main">
+              <a14:hiddenFill xmlns:a14="http://schemas.microsoft.com/office/drawing/2010/main" xmlns="">
                 <a:solidFill>
                   <a:schemeClr val="accent1"/>
                 </a:solidFill>
               </a14:hiddenFill>
             </a:ext>
             <a:ext uri="{91240B29-F687-4f45-9708-019B960494DF}">
-              <a14:hiddenLine xmlns="" xmlns:a14="http://schemas.microsoft.com/office/drawing/2010/main" w="9525">
+              <a14:hiddenLine xmlns:a14="http://schemas.microsoft.com/office/drawing/2010/main" xmlns="" w="9525">
                 <a:solidFill>
                   <a:schemeClr val="tx1"/>
                 </a:solidFill>
@@ -2311,7 +2311,7 @@
               </a14:hiddenLine>
             </a:ext>
             <a:ext uri="{AF507438-7753-43e0-B8FC-AC1667EBCBE1}">
-              <a14:hiddenEffects xmlns="" xmlns:a14="http://schemas.microsoft.com/office/drawing/2010/main">
+              <a14:hiddenEffects xmlns:a14="http://schemas.microsoft.com/office/drawing/2010/main" xmlns="">
                 <a:effectLst>
                   <a:outerShdw blurRad="63500" dist="38099" dir="2700000" algn="ctr" rotWithShape="0">
                     <a:schemeClr val="bg2">
@@ -2368,17 +2368,17 @@
           <a:effectLst/>
           <a:extLst>
             <a:ext uri="{FAA26D3D-D897-4be2-8F04-BA451C77F1D7}">
-              <ma14:placeholderFlag xmlns:ma14="http://schemas.microsoft.com/office/mac/drawingml/2011/main" xmlns="" val="1"/>
+              <ma14:placeholderFlag xmlns="" xmlns:ma14="http://schemas.microsoft.com/office/mac/drawingml/2011/main" val="1"/>
             </a:ext>
             <a:ext uri="{909E8E84-426E-40dd-AFC4-6F175D3DCCD1}">
-              <a14:hiddenFill xmlns="" xmlns:a14="http://schemas.microsoft.com/office/drawing/2010/main">
+              <a14:hiddenFill xmlns:a14="http://schemas.microsoft.com/office/drawing/2010/main" xmlns="">
                 <a:solidFill>
                   <a:schemeClr val="accent1"/>
                 </a:solidFill>
               </a14:hiddenFill>
             </a:ext>
             <a:ext uri="{91240B29-F687-4f45-9708-019B960494DF}">
-              <a14:hiddenLine xmlns="" xmlns:a14="http://schemas.microsoft.com/office/drawing/2010/main" w="9525">
+              <a14:hiddenLine xmlns:a14="http://schemas.microsoft.com/office/drawing/2010/main" xmlns="" w="9525">
                 <a:solidFill>
                   <a:schemeClr val="tx1"/>
                 </a:solidFill>
@@ -2388,7 +2388,7 @@
               </a14:hiddenLine>
             </a:ext>
             <a:ext uri="{AF507438-7753-43e0-B8FC-AC1667EBCBE1}">
-              <a14:hiddenEffects xmlns="" xmlns:a14="http://schemas.microsoft.com/office/drawing/2010/main">
+              <a14:hiddenEffects xmlns:a14="http://schemas.microsoft.com/office/drawing/2010/main" xmlns="">
                 <a:effectLst>
                   <a:outerShdw blurRad="63500" dist="38099" dir="2700000" algn="ctr" rotWithShape="0">
                     <a:schemeClr val="bg2">
@@ -2453,12 +2453,12 @@
           <a:effectLst/>
           <a:extLst>
             <a:ext uri="{909E8E84-426E-40dd-AFC4-6F175D3DCCD1}">
-              <a14:hiddenFill xmlns="" xmlns:a14="http://schemas.microsoft.com/office/drawing/2010/main">
+              <a14:hiddenFill xmlns:a14="http://schemas.microsoft.com/office/drawing/2010/main" xmlns="">
                 <a:noFill/>
               </a14:hiddenFill>
             </a:ext>
             <a:ext uri="{AF507438-7753-43e0-B8FC-AC1667EBCBE1}">
-              <a14:hiddenEffects xmlns="" xmlns:a14="http://schemas.microsoft.com/office/drawing/2010/main">
+              <a14:hiddenEffects xmlns:a14="http://schemas.microsoft.com/office/drawing/2010/main" xmlns="">
                 <a:effectLst>
                   <a:outerShdw blurRad="63500" dist="38099" dir="2700000" algn="ctr" rotWithShape="0">
                     <a:schemeClr val="bg2">
@@ -2501,14 +2501,14 @@
           <a:effectLst/>
           <a:extLst>
             <a:ext uri="{909E8E84-426E-40dd-AFC4-6F175D3DCCD1}">
-              <a14:hiddenFill xmlns="" xmlns:a14="http://schemas.microsoft.com/office/drawing/2010/main">
+              <a14:hiddenFill xmlns:a14="http://schemas.microsoft.com/office/drawing/2010/main" xmlns="">
                 <a:solidFill>
                   <a:schemeClr val="accent1"/>
                 </a:solidFill>
               </a14:hiddenFill>
             </a:ext>
             <a:ext uri="{91240B29-F687-4f45-9708-019B960494DF}">
-              <a14:hiddenLine xmlns="" xmlns:a14="http://schemas.microsoft.com/office/drawing/2010/main" w="9525">
+              <a14:hiddenLine xmlns:a14="http://schemas.microsoft.com/office/drawing/2010/main" xmlns="" w="9525">
                 <a:solidFill>
                   <a:schemeClr val="tx1"/>
                 </a:solidFill>
@@ -2518,7 +2518,7 @@
               </a14:hiddenLine>
             </a:ext>
             <a:ext uri="{AF507438-7753-43e0-B8FC-AC1667EBCBE1}">
-              <a14:hiddenEffects xmlns="" xmlns:a14="http://schemas.microsoft.com/office/drawing/2010/main">
+              <a14:hiddenEffects xmlns:a14="http://schemas.microsoft.com/office/drawing/2010/main" xmlns="">
                 <a:effectLst>
                   <a:outerShdw blurRad="63500" dist="38099" dir="2700000" algn="ctr" rotWithShape="0">
                     <a:schemeClr val="bg2">
@@ -4951,7 +4951,7 @@
           <a:effectLst/>
           <a:extLst>
             <a:ext uri="{AF507438-7753-43e0-B8FC-AC1667EBCBE1}">
-              <a14:hiddenEffects xmlns="" xmlns:a14="http://schemas.microsoft.com/office/drawing/2010/main">
+              <a14:hiddenEffects xmlns:a14="http://schemas.microsoft.com/office/drawing/2010/main" xmlns="">
                 <a:effectLst>
                   <a:outerShdw blurRad="63500" dist="35921" dir="2700000" algn="ctr" rotWithShape="0">
                     <a:schemeClr val="bg2"/>
@@ -5033,7 +5033,7 @@
           <a:effectLst/>
           <a:extLst>
             <a:ext uri="{AF507438-7753-43e0-B8FC-AC1667EBCBE1}">
-              <a14:hiddenEffects xmlns="" xmlns:a14="http://schemas.microsoft.com/office/drawing/2010/main">
+              <a14:hiddenEffects xmlns:a14="http://schemas.microsoft.com/office/drawing/2010/main" xmlns="">
                 <a:effectLst>
                   <a:outerShdw blurRad="63500" dist="35921" dir="2700000" algn="ctr" rotWithShape="0">
                     <a:schemeClr val="bg2"/>
@@ -5156,22 +5156,98 @@
           <a:p>
             <a:pPr lvl="1"/>
             <a:r>
-              <a:rPr lang="en-US" dirty="0"/>
-              <a:t>Goal: combine news data with social media data</a:t>
+              <a:rPr lang="en-US" b="1" dirty="0"/>
+              <a:t>Goal</a:t>
+            </a:r>
+            <a:r>
+              <a:rPr lang="en-US" dirty="0"/>
+              <a:t>: combine news data with social media data</a:t>
             </a:r>
           </a:p>
           <a:p>
             <a:pPr lvl="1"/>
             <a:r>
               <a:rPr lang="en-US" dirty="0"/>
-              <a:t>There are already established packages in R that retrieve data from these platforms. However, we will use these platforms to build some applications from scratch and demonstrate core concepts of data science using R.</a:t>
+              <a:t>There are already </a:t>
+            </a:r>
+            <a:r>
+              <a:rPr lang="en-US" b="1" dirty="0"/>
+              <a:t>established</a:t>
+            </a:r>
+            <a:r>
+              <a:rPr lang="en-US" dirty="0"/>
+              <a:t> </a:t>
+            </a:r>
+            <a:r>
+              <a:rPr lang="en-US" b="1" dirty="0"/>
+              <a:t>packages</a:t>
+            </a:r>
+            <a:r>
+              <a:rPr lang="en-US" dirty="0"/>
+              <a:t> in </a:t>
+            </a:r>
+            <a:r>
+              <a:rPr lang="en-US" b="1" dirty="0"/>
+              <a:t>R</a:t>
+            </a:r>
+            <a:r>
+              <a:rPr lang="en-US" dirty="0"/>
+              <a:t> that retrieve data from these platforms. However, we will use these platforms to </a:t>
+            </a:r>
+            <a:r>
+              <a:rPr lang="en-US" b="1" dirty="0"/>
+              <a:t>build</a:t>
+            </a:r>
+            <a:r>
+              <a:rPr lang="en-US" dirty="0"/>
+              <a:t> </a:t>
+            </a:r>
+            <a:r>
+              <a:rPr lang="en-US" b="1" dirty="0"/>
+              <a:t>some</a:t>
+            </a:r>
+            <a:r>
+              <a:rPr lang="en-US" dirty="0"/>
+              <a:t> </a:t>
+            </a:r>
+            <a:r>
+              <a:rPr lang="en-US" b="1" dirty="0"/>
+              <a:t>applications</a:t>
+            </a:r>
+            <a:r>
+              <a:rPr lang="en-US" dirty="0"/>
+              <a:t> </a:t>
+            </a:r>
+            <a:r>
+              <a:rPr lang="en-US" b="1" dirty="0"/>
+              <a:t>from</a:t>
+            </a:r>
+            <a:r>
+              <a:rPr lang="en-US" dirty="0"/>
+              <a:t> </a:t>
+            </a:r>
+            <a:r>
+              <a:rPr lang="en-US" b="1" dirty="0"/>
+              <a:t>scratch</a:t>
+            </a:r>
+            <a:r>
+              <a:rPr lang="en-US" dirty="0"/>
+              <a:t> and demonstrate core concepts of data science using R.</a:t>
             </a:r>
           </a:p>
           <a:p>
             <a:pPr lvl="1"/>
             <a:r>
               <a:rPr lang="en-US" dirty="0"/>
-              <a:t>Keep in mind: before starting to build your own application, do some research on existing work. Often there are already established ways that work efficiently.</a:t>
+              <a:t>Keep in mind: before starting to build your own application, </a:t>
+            </a:r>
+            <a:r>
+              <a:rPr lang="en-US" b="1" dirty="0"/>
+              <a:t>do some research on existing work</a:t>
+            </a:r>
+            <a:r>
+              <a:rPr lang="en-US" dirty="0"/>
+              <a:t>. Often there are already established ways that work efficiently.</a:t>
             </a:r>
           </a:p>
           <a:p>
@@ -5187,7 +5263,31 @@
             </a:pPr>
             <a:r>
               <a:rPr lang="en-US" dirty="0"/>
-              <a:t>	…manage and process data efficiently.</a:t>
+              <a:t>	…manage and </a:t>
+            </a:r>
+            <a:r>
+              <a:rPr lang="en-US" b="1" dirty="0"/>
+              <a:t>process</a:t>
+            </a:r>
+            <a:r>
+              <a:rPr lang="en-US" dirty="0"/>
+              <a:t> </a:t>
+            </a:r>
+            <a:r>
+              <a:rPr lang="en-US" b="1" dirty="0"/>
+              <a:t>data</a:t>
+            </a:r>
+            <a:r>
+              <a:rPr lang="en-US" dirty="0"/>
+              <a:t> </a:t>
+            </a:r>
+            <a:r>
+              <a:rPr lang="en-US" b="1" dirty="0"/>
+              <a:t>efficiently</a:t>
+            </a:r>
+            <a:r>
+              <a:rPr lang="en-US" dirty="0"/>
+              <a:t>.</a:t>
             </a:r>
           </a:p>
           <a:p>
@@ -5196,7 +5296,23 @@
             </a:pPr>
             <a:r>
               <a:rPr lang="en-US" dirty="0"/>
-              <a:t>	…manipulate text into formats that you can work with.</a:t>
+              <a:t>	…</a:t>
+            </a:r>
+            <a:r>
+              <a:rPr lang="en-US" b="1" dirty="0"/>
+              <a:t>manipulate</a:t>
+            </a:r>
+            <a:r>
+              <a:rPr lang="en-US" dirty="0"/>
+              <a:t> </a:t>
+            </a:r>
+            <a:r>
+              <a:rPr lang="en-US" b="1" dirty="0"/>
+              <a:t>text</a:t>
+            </a:r>
+            <a:r>
+              <a:rPr lang="en-US" dirty="0"/>
+              <a:t> into formats that you can work with.</a:t>
             </a:r>
           </a:p>
           <a:p>
@@ -5205,7 +5321,31 @@
             </a:pPr>
             <a:r>
               <a:rPr lang="en-US" dirty="0"/>
-              <a:t>	…read data from websites into R.</a:t>
+              <a:t>	…</a:t>
+            </a:r>
+            <a:r>
+              <a:rPr lang="en-US" b="1" dirty="0"/>
+              <a:t>read</a:t>
+            </a:r>
+            <a:r>
+              <a:rPr lang="en-US" dirty="0"/>
+              <a:t> </a:t>
+            </a:r>
+            <a:r>
+              <a:rPr lang="en-US" b="1" dirty="0"/>
+              <a:t>data</a:t>
+            </a:r>
+            <a:r>
+              <a:rPr lang="en-US" dirty="0"/>
+              <a:t> from </a:t>
+            </a:r>
+            <a:r>
+              <a:rPr lang="en-US" b="1" dirty="0"/>
+              <a:t>websites</a:t>
+            </a:r>
+            <a:r>
+              <a:rPr lang="en-US" dirty="0"/>
+              <a:t> into R.</a:t>
             </a:r>
           </a:p>
           <a:p>
@@ -5214,7 +5354,15 @@
             </a:pPr>
             <a:r>
               <a:rPr lang="en-US" dirty="0"/>
-              <a:t>	…retrieve data from application programming interfaces (APIs)</a:t>
+              <a:t>	…retrieve data from application programming interfaces (</a:t>
+            </a:r>
+            <a:r>
+              <a:rPr lang="en-US" b="1" dirty="0"/>
+              <a:t>APIs</a:t>
+            </a:r>
+            <a:r>
+              <a:rPr lang="en-US" dirty="0"/>
+              <a:t>)</a:t>
             </a:r>
           </a:p>
           <a:p>
@@ -5411,15 +5559,51 @@
               <a:buNone/>
             </a:pPr>
             <a:r>
-              <a:rPr lang="en-US" dirty="0"/>
-              <a:t>Why use the Internet to collect data?</a:t>
+              <a:rPr lang="en-US" b="1" dirty="0"/>
+              <a:t>Why</a:t>
+            </a:r>
+            <a:r>
+              <a:rPr lang="en-US" dirty="0"/>
+              <a:t> use the </a:t>
+            </a:r>
+            <a:r>
+              <a:rPr lang="en-US" b="1" dirty="0"/>
+              <a:t>Internet</a:t>
+            </a:r>
+            <a:r>
+              <a:rPr lang="en-US" dirty="0"/>
+              <a:t> to collect data?</a:t>
             </a:r>
           </a:p>
           <a:p>
             <a:pPr lvl="2"/>
             <a:r>
               <a:rPr lang="en-US" dirty="0"/>
-              <a:t>Has a plethora of useful data sources:</a:t>
+              <a:t>Has a plethora of </a:t>
+            </a:r>
+            <a:r>
+              <a:rPr lang="en-US" b="1" dirty="0"/>
+              <a:t>useful</a:t>
+            </a:r>
+            <a:r>
+              <a:rPr lang="en-US" dirty="0"/>
+              <a:t> </a:t>
+            </a:r>
+            <a:r>
+              <a:rPr lang="en-US" b="1" dirty="0"/>
+              <a:t>data</a:t>
+            </a:r>
+            <a:r>
+              <a:rPr lang="en-US" dirty="0"/>
+              <a:t> </a:t>
+            </a:r>
+            <a:r>
+              <a:rPr lang="en-US" b="1" dirty="0"/>
+              <a:t>sources</a:t>
+            </a:r>
+            <a:r>
+              <a:rPr lang="en-US" dirty="0"/>
+              <a:t>:</a:t>
             </a:r>
           </a:p>
           <a:p>
@@ -5454,7 +5638,15 @@
             <a:pPr lvl="2"/>
             <a:r>
               <a:rPr lang="en-US" dirty="0"/>
-              <a:t>Why is this relevant?</a:t>
+              <a:t>Why is this </a:t>
+            </a:r>
+            <a:r>
+              <a:rPr lang="en-US" b="1" dirty="0"/>
+              <a:t>relevant</a:t>
+            </a:r>
+            <a:r>
+              <a:rPr lang="en-US" dirty="0"/>
+              <a:t>?</a:t>
             </a:r>
           </a:p>
           <a:p>
@@ -5822,22 +6014,54 @@
               <a:buNone/>
             </a:pPr>
             <a:r>
-              <a:rPr lang="en-US" dirty="0"/>
-              <a:t>Why use the R?</a:t>
+              <a:rPr lang="en-US" b="1" dirty="0"/>
+              <a:t>Why</a:t>
+            </a:r>
+            <a:r>
+              <a:rPr lang="en-US" dirty="0"/>
+              <a:t> use the </a:t>
+            </a:r>
+            <a:r>
+              <a:rPr lang="en-US" b="1" dirty="0"/>
+              <a:t>R</a:t>
+            </a:r>
+            <a:r>
+              <a:rPr lang="en-US" dirty="0"/>
+              <a:t>?</a:t>
             </a:r>
           </a:p>
           <a:p>
             <a:pPr lvl="2"/>
             <a:r>
-              <a:rPr lang="en-US" dirty="0"/>
-              <a:t>Free and open source</a:t>
+              <a:rPr lang="en-US" b="1" dirty="0"/>
+              <a:t>Free</a:t>
+            </a:r>
+            <a:r>
+              <a:rPr lang="en-US" dirty="0"/>
+              <a:t> and open source</a:t>
             </a:r>
           </a:p>
           <a:p>
             <a:pPr lvl="2"/>
             <a:r>
               <a:rPr lang="en-US" dirty="0"/>
-              <a:t>Excels in data visualization and application of statistical methods</a:t>
+              <a:t>Excels in </a:t>
+            </a:r>
+            <a:r>
+              <a:rPr lang="en-US" b="1" dirty="0"/>
+              <a:t>data</a:t>
+            </a:r>
+            <a:r>
+              <a:rPr lang="en-US" dirty="0"/>
+              <a:t> </a:t>
+            </a:r>
+            <a:r>
+              <a:rPr lang="en-US" b="1" dirty="0"/>
+              <a:t>visualization</a:t>
+            </a:r>
+            <a:r>
+              <a:rPr lang="en-US" dirty="0"/>
+              <a:t> and application of statistical methods</a:t>
             </a:r>
           </a:p>
           <a:p>
@@ -5845,6 +6069,25 @@
             <a:r>
               <a:rPr lang="en-US" dirty="0"/>
               <a:t>Also: can be used to collect data on the Internet</a:t>
+            </a:r>
+          </a:p>
+          <a:p>
+            <a:pPr lvl="2"/>
+            <a:r>
+              <a:rPr lang="en-US" b="1" dirty="0"/>
+              <a:t>Beginner</a:t>
+            </a:r>
+            <a:r>
+              <a:rPr lang="en-US" dirty="0"/>
+              <a:t> </a:t>
+            </a:r>
+            <a:r>
+              <a:rPr lang="en-US" b="1" dirty="0"/>
+              <a:t>friendly</a:t>
+            </a:r>
+            <a:r>
+              <a:rPr lang="en-US" dirty="0"/>
+              <a:t> for people with no programming background</a:t>
             </a:r>
           </a:p>
           <a:p>
@@ -5859,7 +6102,43 @@
               <a:rPr lang="en-US" dirty="0">
                 <a:sym typeface="Wingdings" panose="05000000000000000000" pitchFamily="2" charset="2"/>
               </a:rPr>
-              <a:t>	Can be used at every stage of our workflow (no need to switch programs)!</a:t>
+              <a:t>	Can be used at </a:t>
+            </a:r>
+            <a:r>
+              <a:rPr lang="en-US" b="1" dirty="0">
+                <a:sym typeface="Wingdings" panose="05000000000000000000" pitchFamily="2" charset="2"/>
+              </a:rPr>
+              <a:t>every</a:t>
+            </a:r>
+            <a:r>
+              <a:rPr lang="en-US" dirty="0">
+                <a:sym typeface="Wingdings" panose="05000000000000000000" pitchFamily="2" charset="2"/>
+              </a:rPr>
+              <a:t> </a:t>
+            </a:r>
+            <a:r>
+              <a:rPr lang="en-US" b="1" dirty="0">
+                <a:sym typeface="Wingdings" panose="05000000000000000000" pitchFamily="2" charset="2"/>
+              </a:rPr>
+              <a:t>stage</a:t>
+            </a:r>
+            <a:r>
+              <a:rPr lang="en-US" dirty="0">
+                <a:sym typeface="Wingdings" panose="05000000000000000000" pitchFamily="2" charset="2"/>
+              </a:rPr>
+              <a:t> of our </a:t>
+            </a:r>
+            <a:r>
+              <a:rPr lang="en-US" b="1" dirty="0">
+                <a:sym typeface="Wingdings" panose="05000000000000000000" pitchFamily="2" charset="2"/>
+              </a:rPr>
+              <a:t>workflow</a:t>
+            </a:r>
+            <a:r>
+              <a:rPr lang="en-US" dirty="0">
+                <a:sym typeface="Wingdings" panose="05000000000000000000" pitchFamily="2" charset="2"/>
+              </a:rPr>
+              <a:t> (no need to switch programs)!</a:t>
             </a:r>
             <a:endParaRPr lang="en-US" dirty="0"/>
           </a:p>
@@ -5967,7 +6246,7 @@
         </p:nvSpPr>
         <p:spPr bwMode="auto">
           <a:xfrm>
-            <a:off x="1362734" y="4041130"/>
+            <a:off x="1350433" y="4365104"/>
             <a:ext cx="368299" cy="215900"/>
           </a:xfrm>
           <a:prstGeom prst="rightArrow">
@@ -5986,7 +6265,7 @@
           <a:effectLst/>
           <a:extLst>
             <a:ext uri="{AF507438-7753-43e0-B8FC-AC1667EBCBE1}">
-              <a14:hiddenEffects xmlns="" xmlns:a14="http://schemas.microsoft.com/office/drawing/2010/main">
+              <a14:hiddenEffects xmlns:a14="http://schemas.microsoft.com/office/drawing/2010/main" xmlns="">
                 <a:effectLst>
                   <a:outerShdw blurRad="63500" dist="35921" dir="2700000" algn="ctr" rotWithShape="0">
                     <a:schemeClr val="bg2"/>
@@ -6216,7 +6495,7 @@
             <a:pPr lvl="1"/>
             <a:r>
               <a:rPr lang="en-US" dirty="0"/>
-              <a:t>Most datasets will not be prepared for R (e.g. .csv-files, Excel files, etc.) and we will learn in the next exercise more about those ways.</a:t>
+              <a:t>Most datasets will not be prepared for R (e.g. .csv-files, Excel files, etc.) and we will learn in the next exercise more about the ways to recognize data formats and how to import them.</a:t>
             </a:r>
           </a:p>
           <a:p>
@@ -6791,26 +7070,79 @@
           <a:p>
             <a:r>
               <a:rPr lang="en-US" dirty="0"/>
-              <a:t>Access innovative and large data resources</a:t>
-            </a:r>
-          </a:p>
-          <a:p>
-            <a:r>
-              <a:rPr lang="en-US" dirty="0"/>
-              <a:t>Process data to make it machine readable</a:t>
-            </a:r>
-          </a:p>
-          <a:p>
-            <a:r>
-              <a:rPr lang="en-US" dirty="0"/>
-              <a:t>Use statistical methods or machine learning  to detect structure in the data</a:t>
-            </a:r>
-          </a:p>
-          <a:p>
-            <a:r>
-              <a:rPr lang="en-US" dirty="0"/>
-              <a:t>Provide meaningful insights into data</a:t>
-            </a:r>
+              <a:t>Access innovative and </a:t>
+            </a:r>
+            <a:r>
+              <a:rPr lang="en-US" b="1" dirty="0"/>
+              <a:t>large</a:t>
+            </a:r>
+            <a:r>
+              <a:rPr lang="en-US" dirty="0"/>
+              <a:t> </a:t>
+            </a:r>
+            <a:r>
+              <a:rPr lang="en-US" b="1" dirty="0"/>
+              <a:t>data</a:t>
+            </a:r>
+            <a:r>
+              <a:rPr lang="en-US" dirty="0"/>
+              <a:t> resources.</a:t>
+            </a:r>
+          </a:p>
+          <a:p>
+            <a:r>
+              <a:rPr lang="en-US" b="1" dirty="0"/>
+              <a:t>Process</a:t>
+            </a:r>
+            <a:r>
+              <a:rPr lang="en-US" dirty="0"/>
+              <a:t> </a:t>
+            </a:r>
+            <a:r>
+              <a:rPr lang="en-US" b="1" dirty="0"/>
+              <a:t>data</a:t>
+            </a:r>
+            <a:r>
+              <a:rPr lang="en-US" dirty="0"/>
+              <a:t> to make it machine readable.</a:t>
+            </a:r>
+          </a:p>
+          <a:p>
+            <a:r>
+              <a:rPr lang="en-US" dirty="0"/>
+              <a:t>Use statistical methods or machine learning  to </a:t>
+            </a:r>
+            <a:r>
+              <a:rPr lang="en-US" b="1" dirty="0"/>
+              <a:t>detect</a:t>
+            </a:r>
+            <a:r>
+              <a:rPr lang="en-US" dirty="0"/>
+              <a:t> </a:t>
+            </a:r>
+            <a:r>
+              <a:rPr lang="en-US" b="1" dirty="0"/>
+              <a:t>structure</a:t>
+            </a:r>
+            <a:r>
+              <a:rPr lang="en-US" dirty="0"/>
+              <a:t> in the data.</a:t>
+            </a:r>
+          </a:p>
+          <a:p>
+            <a:r>
+              <a:rPr lang="en-US" b="1" dirty="0"/>
+              <a:t>Provide</a:t>
+            </a:r>
+            <a:r>
+              <a:rPr lang="en-US" dirty="0"/>
+              <a:t> meaningful </a:t>
+            </a:r>
+            <a:r>
+              <a:rPr lang="en-US" b="1" dirty="0"/>
+              <a:t>insights.</a:t>
+            </a:r>
+            <a:endParaRPr lang="en-US" dirty="0"/>
           </a:p>
         </p:txBody>
       </p:sp>
@@ -7020,6 +7352,9 @@
           <a:bodyPr/>
           <a:lstStyle/>
           <a:p>
+            <a:pPr marL="0" indent="0">
+              <a:buNone/>
+            </a:pPr>
             <a:r>
               <a:rPr lang="en-US" dirty="0"/>
               <a:t>What is good science?</a:t>
@@ -7066,7 +7401,7 @@
             <a:pPr lvl="1"/>
             <a:r>
               <a:rPr lang="en-US" dirty="0"/>
-              <a:t>Karl Popper (1934): “non-reproducible single occurrences are of no significance to science”</a:t>
+              <a:t>Karl Popper (1934): “non-reproducible single occurrences are of no significance to science”.</a:t>
             </a:r>
           </a:p>
           <a:p>
@@ -7079,7 +7414,71 @@
             <a:pPr lvl="1"/>
             <a:r>
               <a:rPr lang="en-US" dirty="0"/>
-              <a:t>Emphasizes the need for publication of employed methods, documentation of the data collection and cleaning process, and the provision of datasets.</a:t>
+              <a:t>Emphasizes the need for </a:t>
+            </a:r>
+            <a:r>
+              <a:rPr lang="en-US" b="1" dirty="0"/>
+              <a:t>publication</a:t>
+            </a:r>
+            <a:r>
+              <a:rPr lang="en-US" dirty="0"/>
+              <a:t> of employed </a:t>
+            </a:r>
+            <a:r>
+              <a:rPr lang="en-US" b="1" dirty="0"/>
+              <a:t>methods</a:t>
+            </a:r>
+            <a:r>
+              <a:rPr lang="en-US" dirty="0"/>
+              <a:t>, </a:t>
+            </a:r>
+            <a:r>
+              <a:rPr lang="en-US" b="1" dirty="0"/>
+              <a:t>documentation</a:t>
+            </a:r>
+            <a:r>
+              <a:rPr lang="en-US" dirty="0"/>
+              <a:t> of the </a:t>
+            </a:r>
+            <a:r>
+              <a:rPr lang="en-US" b="1" dirty="0"/>
+              <a:t>data</a:t>
+            </a:r>
+            <a:r>
+              <a:rPr lang="en-US" dirty="0"/>
+              <a:t> </a:t>
+            </a:r>
+            <a:r>
+              <a:rPr lang="en-US" b="1" dirty="0"/>
+              <a:t>collection</a:t>
+            </a:r>
+            <a:r>
+              <a:rPr lang="en-US" dirty="0"/>
+              <a:t> and cleaning process, and the </a:t>
+            </a:r>
+            <a:r>
+              <a:rPr lang="en-US" b="1" dirty="0"/>
+              <a:t>provision</a:t>
+            </a:r>
+            <a:r>
+              <a:rPr lang="en-US" dirty="0"/>
+              <a:t> </a:t>
+            </a:r>
+            <a:r>
+              <a:rPr lang="en-US" b="1" dirty="0"/>
+              <a:t>of</a:t>
+            </a:r>
+            <a:r>
+              <a:rPr lang="en-US" dirty="0"/>
+              <a:t> </a:t>
+            </a:r>
+            <a:r>
+              <a:rPr lang="en-US" b="1" dirty="0"/>
+              <a:t>datasets</a:t>
+            </a:r>
+            <a:r>
+              <a:rPr lang="en-US" dirty="0"/>
+              <a:t>.</a:t>
             </a:r>
           </a:p>
           <a:p>
@@ -7264,37 +7663,67 @@
           <a:bodyPr/>
           <a:lstStyle/>
           <a:p>
-            <a:pPr lvl="1"/>
-            <a:r>
-              <a:rPr lang="en-US" dirty="0"/>
-              <a:t>Why is reproducibility in data science difficult?</a:t>
-            </a:r>
-          </a:p>
-          <a:p>
             <a:pPr marL="342000" lvl="1" indent="0">
               <a:buNone/>
             </a:pPr>
+            <a:r>
+              <a:rPr lang="en-US" dirty="0"/>
+              <a:t>Why is reproducibility in data science difficult?</a:t>
+            </a:r>
+          </a:p>
+          <a:p>
+            <a:pPr marL="342000" lvl="1" indent="0">
+              <a:buNone/>
+            </a:pPr>
             <a:endParaRPr lang="en-US" dirty="0"/>
           </a:p>
           <a:p>
             <a:pPr lvl="2"/>
             <a:r>
               <a:rPr lang="en-US" dirty="0"/>
-              <a:t>Available resources (e.g. computing power, storage)</a:t>
+              <a:t>Available </a:t>
+            </a:r>
+            <a:r>
+              <a:rPr lang="en-US" b="1" dirty="0"/>
+              <a:t>resources</a:t>
+            </a:r>
+            <a:r>
+              <a:rPr lang="en-US" dirty="0"/>
+              <a:t> (e.g. computing power, storage)</a:t>
             </a:r>
           </a:p>
           <a:p>
             <a:pPr lvl="2"/>
             <a:r>
               <a:rPr lang="en-US" dirty="0"/>
-              <a:t>Data on the Internet often in flux (e.g. websites change, Tweets get deleted…)</a:t>
+              <a:t>Data on the Internet often </a:t>
+            </a:r>
+            <a:r>
+              <a:rPr lang="en-US" b="1" dirty="0"/>
+              <a:t>in</a:t>
+            </a:r>
+            <a:r>
+              <a:rPr lang="en-US" dirty="0"/>
+              <a:t> </a:t>
+            </a:r>
+            <a:r>
+              <a:rPr lang="en-US" b="1" dirty="0"/>
+              <a:t>flux</a:t>
+            </a:r>
+            <a:r>
+              <a:rPr lang="en-US" dirty="0"/>
+              <a:t> (e.g. websites change, Tweets get deleted…)</a:t>
             </a:r>
           </a:p>
           <a:p>
             <a:pPr lvl="2"/>
             <a:r>
-              <a:rPr lang="en-US" dirty="0"/>
-              <a:t>Permission to use data (e.g. Facebook data)</a:t>
+              <a:rPr lang="en-US" b="1" dirty="0"/>
+              <a:t>Permission</a:t>
+            </a:r>
+            <a:r>
+              <a:rPr lang="en-US" dirty="0"/>
+              <a:t> to use data (e.g. Facebook data)</a:t>
             </a:r>
           </a:p>
           <a:p>
@@ -7302,10 +7731,14 @@
             <a:endParaRPr lang="en-US" dirty="0"/>
           </a:p>
           <a:p>
-            <a:pPr lvl="1"/>
-            <a:r>
-              <a:rPr lang="en-US" dirty="0"/>
-              <a:t>Git is one way to improve on one part of the reproducibility crisis: make method transparent and easily accessible.</a:t>
+            <a:pPr lvl="2"/>
+            <a:r>
+              <a:rPr lang="en-US" b="1" dirty="0"/>
+              <a:t>Git</a:t>
+            </a:r>
+            <a:r>
+              <a:rPr lang="en-US" dirty="0"/>
+              <a:t> is one way to improve on one part of the reproducibility crisis: make method transparent and easily accessible.</a:t>
             </a:r>
           </a:p>
         </p:txBody>
@@ -8243,7 +8676,7 @@
         <a:effectLst/>
         <a:extLst>
           <a:ext uri="{AF507438-7753-43e0-B8FC-AC1667EBCBE1}">
-            <a14:hiddenEffects xmlns="" xmlns:a14="http://schemas.microsoft.com/office/drawing/2010/main">
+            <a14:hiddenEffects xmlns:a14="http://schemas.microsoft.com/office/drawing/2010/main" xmlns="">
               <a:effectLst>
                 <a:outerShdw blurRad="63500" dist="35921" dir="2700000" algn="ctr" rotWithShape="0">
                   <a:schemeClr val="bg2"/>
@@ -8318,7 +8751,7 @@
         <a:effectLst/>
         <a:extLst>
           <a:ext uri="{AF507438-7753-43e0-B8FC-AC1667EBCBE1}">
-            <a14:hiddenEffects xmlns="" xmlns:a14="http://schemas.microsoft.com/office/drawing/2010/main">
+            <a14:hiddenEffects xmlns:a14="http://schemas.microsoft.com/office/drawing/2010/main" xmlns="">
               <a:effectLst>
                 <a:outerShdw blurRad="63500" dist="35921" dir="2700000" algn="ctr" rotWithShape="0">
                   <a:schemeClr val="bg2"/>

</xml_diff>